<commit_message>
EmailCommand docs for DeveloperGuide#2
</commit_message>
<xml_diff>
--- a/docs/diagrams/SDforEmail.pptx
+++ b/docs/diagrams/SDforEmail.pptx
@@ -129,7 +129,7 @@
           <p:cNvPr id="2" name="Title 1">
             <a:extLst>
               <a:ext uri="{FF2B5EF4-FFF2-40B4-BE49-F238E27FC236}">
-                <a16:creationId xmlns:a16="http://schemas.microsoft.com/office/drawing/2014/main" id="{B158D7AD-D29B-46AD-8C80-BEABD6E2EFB7}"/>
+                <a16:creationId xmlns:a16="http://schemas.microsoft.com/office/drawing/2014/main" xmlns="" id="{B158D7AD-D29B-46AD-8C80-BEABD6E2EFB7}"/>
               </a:ext>
             </a:extLst>
           </p:cNvPr>
@@ -167,7 +167,7 @@
           <p:cNvPr id="3" name="Subtitle 2">
             <a:extLst>
               <a:ext uri="{FF2B5EF4-FFF2-40B4-BE49-F238E27FC236}">
-                <a16:creationId xmlns:a16="http://schemas.microsoft.com/office/drawing/2014/main" id="{1AC0BEDE-DF79-4BCE-A178-0E964C4AAEB4}"/>
+                <a16:creationId xmlns:a16="http://schemas.microsoft.com/office/drawing/2014/main" xmlns="" id="{1AC0BEDE-DF79-4BCE-A178-0E964C4AAEB4}"/>
               </a:ext>
             </a:extLst>
           </p:cNvPr>
@@ -238,7 +238,7 @@
           <p:cNvPr id="4" name="Date Placeholder 3">
             <a:extLst>
               <a:ext uri="{FF2B5EF4-FFF2-40B4-BE49-F238E27FC236}">
-                <a16:creationId xmlns:a16="http://schemas.microsoft.com/office/drawing/2014/main" id="{D5848B38-7A08-46AB-94B2-4AF1A134BE37}"/>
+                <a16:creationId xmlns:a16="http://schemas.microsoft.com/office/drawing/2014/main" xmlns="" id="{D5848B38-7A08-46AB-94B2-4AF1A134BE37}"/>
               </a:ext>
             </a:extLst>
           </p:cNvPr>
@@ -267,7 +267,7 @@
           <p:cNvPr id="5" name="Footer Placeholder 4">
             <a:extLst>
               <a:ext uri="{FF2B5EF4-FFF2-40B4-BE49-F238E27FC236}">
-                <a16:creationId xmlns:a16="http://schemas.microsoft.com/office/drawing/2014/main" id="{47BA83C6-7643-4841-8F26-71B3CA909A04}"/>
+                <a16:creationId xmlns:a16="http://schemas.microsoft.com/office/drawing/2014/main" xmlns="" id="{47BA83C6-7643-4841-8F26-71B3CA909A04}"/>
               </a:ext>
             </a:extLst>
           </p:cNvPr>
@@ -292,7 +292,7 @@
           <p:cNvPr id="6" name="Slide Number Placeholder 5">
             <a:extLst>
               <a:ext uri="{FF2B5EF4-FFF2-40B4-BE49-F238E27FC236}">
-                <a16:creationId xmlns:a16="http://schemas.microsoft.com/office/drawing/2014/main" id="{09F95125-4AB4-47E5-9A24-587816697294}"/>
+                <a16:creationId xmlns:a16="http://schemas.microsoft.com/office/drawing/2014/main" xmlns="" id="{09F95125-4AB4-47E5-9A24-587816697294}"/>
               </a:ext>
             </a:extLst>
           </p:cNvPr>
@@ -351,7 +351,7 @@
           <p:cNvPr id="2" name="Title 1">
             <a:extLst>
               <a:ext uri="{FF2B5EF4-FFF2-40B4-BE49-F238E27FC236}">
-                <a16:creationId xmlns:a16="http://schemas.microsoft.com/office/drawing/2014/main" id="{5193CF02-A698-4C81-A082-D7C772ABBB16}"/>
+                <a16:creationId xmlns:a16="http://schemas.microsoft.com/office/drawing/2014/main" xmlns="" id="{5193CF02-A698-4C81-A082-D7C772ABBB16}"/>
               </a:ext>
             </a:extLst>
           </p:cNvPr>
@@ -380,7 +380,7 @@
           <p:cNvPr id="3" name="Vertical Text Placeholder 2">
             <a:extLst>
               <a:ext uri="{FF2B5EF4-FFF2-40B4-BE49-F238E27FC236}">
-                <a16:creationId xmlns:a16="http://schemas.microsoft.com/office/drawing/2014/main" id="{05E4DDE3-1610-4BE5-B7A4-4DC541E5E8EA}"/>
+                <a16:creationId xmlns:a16="http://schemas.microsoft.com/office/drawing/2014/main" xmlns="" id="{05E4DDE3-1610-4BE5-B7A4-4DC541E5E8EA}"/>
               </a:ext>
             </a:extLst>
           </p:cNvPr>
@@ -438,7 +438,7 @@
           <p:cNvPr id="4" name="Date Placeholder 3">
             <a:extLst>
               <a:ext uri="{FF2B5EF4-FFF2-40B4-BE49-F238E27FC236}">
-                <a16:creationId xmlns:a16="http://schemas.microsoft.com/office/drawing/2014/main" id="{7BA341F4-8F3D-4930-97E9-8B3D816C0FBA}"/>
+                <a16:creationId xmlns:a16="http://schemas.microsoft.com/office/drawing/2014/main" xmlns="" id="{7BA341F4-8F3D-4930-97E9-8B3D816C0FBA}"/>
               </a:ext>
             </a:extLst>
           </p:cNvPr>
@@ -467,7 +467,7 @@
           <p:cNvPr id="5" name="Footer Placeholder 4">
             <a:extLst>
               <a:ext uri="{FF2B5EF4-FFF2-40B4-BE49-F238E27FC236}">
-                <a16:creationId xmlns:a16="http://schemas.microsoft.com/office/drawing/2014/main" id="{5F7BF4F1-1DBD-4B98-A18C-69DA7B06B153}"/>
+                <a16:creationId xmlns:a16="http://schemas.microsoft.com/office/drawing/2014/main" xmlns="" id="{5F7BF4F1-1DBD-4B98-A18C-69DA7B06B153}"/>
               </a:ext>
             </a:extLst>
           </p:cNvPr>
@@ -492,7 +492,7 @@
           <p:cNvPr id="6" name="Slide Number Placeholder 5">
             <a:extLst>
               <a:ext uri="{FF2B5EF4-FFF2-40B4-BE49-F238E27FC236}">
-                <a16:creationId xmlns:a16="http://schemas.microsoft.com/office/drawing/2014/main" id="{719511DD-EBA6-4401-8F2F-17CB3A099EA7}"/>
+                <a16:creationId xmlns:a16="http://schemas.microsoft.com/office/drawing/2014/main" xmlns="" id="{719511DD-EBA6-4401-8F2F-17CB3A099EA7}"/>
               </a:ext>
             </a:extLst>
           </p:cNvPr>
@@ -551,7 +551,7 @@
           <p:cNvPr id="2" name="Vertical Title 1">
             <a:extLst>
               <a:ext uri="{FF2B5EF4-FFF2-40B4-BE49-F238E27FC236}">
-                <a16:creationId xmlns:a16="http://schemas.microsoft.com/office/drawing/2014/main" id="{01AD6126-39F2-4DBC-85AE-6CC64C8313A7}"/>
+                <a16:creationId xmlns:a16="http://schemas.microsoft.com/office/drawing/2014/main" xmlns="" id="{01AD6126-39F2-4DBC-85AE-6CC64C8313A7}"/>
               </a:ext>
             </a:extLst>
           </p:cNvPr>
@@ -585,7 +585,7 @@
           <p:cNvPr id="3" name="Vertical Text Placeholder 2">
             <a:extLst>
               <a:ext uri="{FF2B5EF4-FFF2-40B4-BE49-F238E27FC236}">
-                <a16:creationId xmlns:a16="http://schemas.microsoft.com/office/drawing/2014/main" id="{BAF61A87-9D2C-4C33-B5E2-2C274C03A902}"/>
+                <a16:creationId xmlns:a16="http://schemas.microsoft.com/office/drawing/2014/main" xmlns="" id="{BAF61A87-9D2C-4C33-B5E2-2C274C03A902}"/>
               </a:ext>
             </a:extLst>
           </p:cNvPr>
@@ -648,7 +648,7 @@
           <p:cNvPr id="4" name="Date Placeholder 3">
             <a:extLst>
               <a:ext uri="{FF2B5EF4-FFF2-40B4-BE49-F238E27FC236}">
-                <a16:creationId xmlns:a16="http://schemas.microsoft.com/office/drawing/2014/main" id="{79974E2C-343F-449C-B75D-962C3AD82676}"/>
+                <a16:creationId xmlns:a16="http://schemas.microsoft.com/office/drawing/2014/main" xmlns="" id="{79974E2C-343F-449C-B75D-962C3AD82676}"/>
               </a:ext>
             </a:extLst>
           </p:cNvPr>
@@ -677,7 +677,7 @@
           <p:cNvPr id="5" name="Footer Placeholder 4">
             <a:extLst>
               <a:ext uri="{FF2B5EF4-FFF2-40B4-BE49-F238E27FC236}">
-                <a16:creationId xmlns:a16="http://schemas.microsoft.com/office/drawing/2014/main" id="{D64A4A5F-27FB-4035-9658-ABE5C4C24D67}"/>
+                <a16:creationId xmlns:a16="http://schemas.microsoft.com/office/drawing/2014/main" xmlns="" id="{D64A4A5F-27FB-4035-9658-ABE5C4C24D67}"/>
               </a:ext>
             </a:extLst>
           </p:cNvPr>
@@ -702,7 +702,7 @@
           <p:cNvPr id="6" name="Slide Number Placeholder 5">
             <a:extLst>
               <a:ext uri="{FF2B5EF4-FFF2-40B4-BE49-F238E27FC236}">
-                <a16:creationId xmlns:a16="http://schemas.microsoft.com/office/drawing/2014/main" id="{06E668DE-8F92-4A57-9C66-B7034CD252EC}"/>
+                <a16:creationId xmlns:a16="http://schemas.microsoft.com/office/drawing/2014/main" xmlns="" id="{06E668DE-8F92-4A57-9C66-B7034CD252EC}"/>
               </a:ext>
             </a:extLst>
           </p:cNvPr>
@@ -761,7 +761,7 @@
           <p:cNvPr id="2" name="Title 1">
             <a:extLst>
               <a:ext uri="{FF2B5EF4-FFF2-40B4-BE49-F238E27FC236}">
-                <a16:creationId xmlns:a16="http://schemas.microsoft.com/office/drawing/2014/main" id="{CD5988E1-CD98-48AB-AF5F-16D0765481C9}"/>
+                <a16:creationId xmlns:a16="http://schemas.microsoft.com/office/drawing/2014/main" xmlns="" id="{CD5988E1-CD98-48AB-AF5F-16D0765481C9}"/>
               </a:ext>
             </a:extLst>
           </p:cNvPr>
@@ -790,7 +790,7 @@
           <p:cNvPr id="3" name="Content Placeholder 2">
             <a:extLst>
               <a:ext uri="{FF2B5EF4-FFF2-40B4-BE49-F238E27FC236}">
-                <a16:creationId xmlns:a16="http://schemas.microsoft.com/office/drawing/2014/main" id="{3DC952A9-F106-4514-A093-9EF54FACCC4F}"/>
+                <a16:creationId xmlns:a16="http://schemas.microsoft.com/office/drawing/2014/main" xmlns="" id="{3DC952A9-F106-4514-A093-9EF54FACCC4F}"/>
               </a:ext>
             </a:extLst>
           </p:cNvPr>
@@ -848,7 +848,7 @@
           <p:cNvPr id="4" name="Date Placeholder 3">
             <a:extLst>
               <a:ext uri="{FF2B5EF4-FFF2-40B4-BE49-F238E27FC236}">
-                <a16:creationId xmlns:a16="http://schemas.microsoft.com/office/drawing/2014/main" id="{478E1EC0-80DB-4895-A132-9CF73DA245D0}"/>
+                <a16:creationId xmlns:a16="http://schemas.microsoft.com/office/drawing/2014/main" xmlns="" id="{478E1EC0-80DB-4895-A132-9CF73DA245D0}"/>
               </a:ext>
             </a:extLst>
           </p:cNvPr>
@@ -877,7 +877,7 @@
           <p:cNvPr id="5" name="Footer Placeholder 4">
             <a:extLst>
               <a:ext uri="{FF2B5EF4-FFF2-40B4-BE49-F238E27FC236}">
-                <a16:creationId xmlns:a16="http://schemas.microsoft.com/office/drawing/2014/main" id="{E3C44F12-52DD-489A-932F-BC53104E9BE9}"/>
+                <a16:creationId xmlns:a16="http://schemas.microsoft.com/office/drawing/2014/main" xmlns="" id="{E3C44F12-52DD-489A-932F-BC53104E9BE9}"/>
               </a:ext>
             </a:extLst>
           </p:cNvPr>
@@ -902,7 +902,7 @@
           <p:cNvPr id="6" name="Slide Number Placeholder 5">
             <a:extLst>
               <a:ext uri="{FF2B5EF4-FFF2-40B4-BE49-F238E27FC236}">
-                <a16:creationId xmlns:a16="http://schemas.microsoft.com/office/drawing/2014/main" id="{B9A4062D-7B7E-4FBB-8D38-EAE5BEEF1E2B}"/>
+                <a16:creationId xmlns:a16="http://schemas.microsoft.com/office/drawing/2014/main" xmlns="" id="{B9A4062D-7B7E-4FBB-8D38-EAE5BEEF1E2B}"/>
               </a:ext>
             </a:extLst>
           </p:cNvPr>
@@ -961,7 +961,7 @@
           <p:cNvPr id="2" name="Title 1">
             <a:extLst>
               <a:ext uri="{FF2B5EF4-FFF2-40B4-BE49-F238E27FC236}">
-                <a16:creationId xmlns:a16="http://schemas.microsoft.com/office/drawing/2014/main" id="{5B5FEAFD-358B-4AF2-B8B4-7DD0B4FEB6A5}"/>
+                <a16:creationId xmlns:a16="http://schemas.microsoft.com/office/drawing/2014/main" xmlns="" id="{5B5FEAFD-358B-4AF2-B8B4-7DD0B4FEB6A5}"/>
               </a:ext>
             </a:extLst>
           </p:cNvPr>
@@ -999,7 +999,7 @@
           <p:cNvPr id="3" name="Text Placeholder 2">
             <a:extLst>
               <a:ext uri="{FF2B5EF4-FFF2-40B4-BE49-F238E27FC236}">
-                <a16:creationId xmlns:a16="http://schemas.microsoft.com/office/drawing/2014/main" id="{2E7B14EE-F582-46BF-9CE2-4E1C05F319E8}"/>
+                <a16:creationId xmlns:a16="http://schemas.microsoft.com/office/drawing/2014/main" xmlns="" id="{2E7B14EE-F582-46BF-9CE2-4E1C05F319E8}"/>
               </a:ext>
             </a:extLst>
           </p:cNvPr>
@@ -1124,7 +1124,7 @@
           <p:cNvPr id="4" name="Date Placeholder 3">
             <a:extLst>
               <a:ext uri="{FF2B5EF4-FFF2-40B4-BE49-F238E27FC236}">
-                <a16:creationId xmlns:a16="http://schemas.microsoft.com/office/drawing/2014/main" id="{47CF583A-D903-4A24-9827-1937B5596853}"/>
+                <a16:creationId xmlns:a16="http://schemas.microsoft.com/office/drawing/2014/main" xmlns="" id="{47CF583A-D903-4A24-9827-1937B5596853}"/>
               </a:ext>
             </a:extLst>
           </p:cNvPr>
@@ -1153,7 +1153,7 @@
           <p:cNvPr id="5" name="Footer Placeholder 4">
             <a:extLst>
               <a:ext uri="{FF2B5EF4-FFF2-40B4-BE49-F238E27FC236}">
-                <a16:creationId xmlns:a16="http://schemas.microsoft.com/office/drawing/2014/main" id="{6DA45973-519A-456C-8351-26960A899BC9}"/>
+                <a16:creationId xmlns:a16="http://schemas.microsoft.com/office/drawing/2014/main" xmlns="" id="{6DA45973-519A-456C-8351-26960A899BC9}"/>
               </a:ext>
             </a:extLst>
           </p:cNvPr>
@@ -1178,7 +1178,7 @@
           <p:cNvPr id="6" name="Slide Number Placeholder 5">
             <a:extLst>
               <a:ext uri="{FF2B5EF4-FFF2-40B4-BE49-F238E27FC236}">
-                <a16:creationId xmlns:a16="http://schemas.microsoft.com/office/drawing/2014/main" id="{88E3F895-E433-41BA-98A8-8C5F4C3DDA2C}"/>
+                <a16:creationId xmlns:a16="http://schemas.microsoft.com/office/drawing/2014/main" xmlns="" id="{88E3F895-E433-41BA-98A8-8C5F4C3DDA2C}"/>
               </a:ext>
             </a:extLst>
           </p:cNvPr>
@@ -1237,7 +1237,7 @@
           <p:cNvPr id="2" name="Title 1">
             <a:extLst>
               <a:ext uri="{FF2B5EF4-FFF2-40B4-BE49-F238E27FC236}">
-                <a16:creationId xmlns:a16="http://schemas.microsoft.com/office/drawing/2014/main" id="{24F2510A-85DF-436A-BA54-67B18D179090}"/>
+                <a16:creationId xmlns:a16="http://schemas.microsoft.com/office/drawing/2014/main" xmlns="" id="{24F2510A-85DF-436A-BA54-67B18D179090}"/>
               </a:ext>
             </a:extLst>
           </p:cNvPr>
@@ -1266,7 +1266,7 @@
           <p:cNvPr id="3" name="Content Placeholder 2">
             <a:extLst>
               <a:ext uri="{FF2B5EF4-FFF2-40B4-BE49-F238E27FC236}">
-                <a16:creationId xmlns:a16="http://schemas.microsoft.com/office/drawing/2014/main" id="{441327E3-9403-4991-A2CD-F5AACF23F253}"/>
+                <a16:creationId xmlns:a16="http://schemas.microsoft.com/office/drawing/2014/main" xmlns="" id="{441327E3-9403-4991-A2CD-F5AACF23F253}"/>
               </a:ext>
             </a:extLst>
           </p:cNvPr>
@@ -1329,7 +1329,7 @@
           <p:cNvPr id="4" name="Content Placeholder 3">
             <a:extLst>
               <a:ext uri="{FF2B5EF4-FFF2-40B4-BE49-F238E27FC236}">
-                <a16:creationId xmlns:a16="http://schemas.microsoft.com/office/drawing/2014/main" id="{431A8EEA-29C9-4D75-9374-C05335242089}"/>
+                <a16:creationId xmlns:a16="http://schemas.microsoft.com/office/drawing/2014/main" xmlns="" id="{431A8EEA-29C9-4D75-9374-C05335242089}"/>
               </a:ext>
             </a:extLst>
           </p:cNvPr>
@@ -1392,7 +1392,7 @@
           <p:cNvPr id="5" name="Date Placeholder 4">
             <a:extLst>
               <a:ext uri="{FF2B5EF4-FFF2-40B4-BE49-F238E27FC236}">
-                <a16:creationId xmlns:a16="http://schemas.microsoft.com/office/drawing/2014/main" id="{814BA9FF-4D35-4B37-BA0B-750A19C69565}"/>
+                <a16:creationId xmlns:a16="http://schemas.microsoft.com/office/drawing/2014/main" xmlns="" id="{814BA9FF-4D35-4B37-BA0B-750A19C69565}"/>
               </a:ext>
             </a:extLst>
           </p:cNvPr>
@@ -1421,7 +1421,7 @@
           <p:cNvPr id="6" name="Footer Placeholder 5">
             <a:extLst>
               <a:ext uri="{FF2B5EF4-FFF2-40B4-BE49-F238E27FC236}">
-                <a16:creationId xmlns:a16="http://schemas.microsoft.com/office/drawing/2014/main" id="{3E8E22B9-54D7-4BA6-AB2C-91E42191716F}"/>
+                <a16:creationId xmlns:a16="http://schemas.microsoft.com/office/drawing/2014/main" xmlns="" id="{3E8E22B9-54D7-4BA6-AB2C-91E42191716F}"/>
               </a:ext>
             </a:extLst>
           </p:cNvPr>
@@ -1446,7 +1446,7 @@
           <p:cNvPr id="7" name="Slide Number Placeholder 6">
             <a:extLst>
               <a:ext uri="{FF2B5EF4-FFF2-40B4-BE49-F238E27FC236}">
-                <a16:creationId xmlns:a16="http://schemas.microsoft.com/office/drawing/2014/main" id="{A7D1BE47-5933-4FAD-8846-D99B83CD6902}"/>
+                <a16:creationId xmlns:a16="http://schemas.microsoft.com/office/drawing/2014/main" xmlns="" id="{A7D1BE47-5933-4FAD-8846-D99B83CD6902}"/>
               </a:ext>
             </a:extLst>
           </p:cNvPr>
@@ -1505,7 +1505,7 @@
           <p:cNvPr id="2" name="Title 1">
             <a:extLst>
               <a:ext uri="{FF2B5EF4-FFF2-40B4-BE49-F238E27FC236}">
-                <a16:creationId xmlns:a16="http://schemas.microsoft.com/office/drawing/2014/main" id="{63E21CB4-4BAC-48E1-8597-1C1A2A71AA61}"/>
+                <a16:creationId xmlns:a16="http://schemas.microsoft.com/office/drawing/2014/main" xmlns="" id="{63E21CB4-4BAC-48E1-8597-1C1A2A71AA61}"/>
               </a:ext>
             </a:extLst>
           </p:cNvPr>
@@ -1539,7 +1539,7 @@
           <p:cNvPr id="3" name="Text Placeholder 2">
             <a:extLst>
               <a:ext uri="{FF2B5EF4-FFF2-40B4-BE49-F238E27FC236}">
-                <a16:creationId xmlns:a16="http://schemas.microsoft.com/office/drawing/2014/main" id="{A879F973-7525-4DBF-A3FC-32891837737B}"/>
+                <a16:creationId xmlns:a16="http://schemas.microsoft.com/office/drawing/2014/main" xmlns="" id="{A879F973-7525-4DBF-A3FC-32891837737B}"/>
               </a:ext>
             </a:extLst>
           </p:cNvPr>
@@ -1610,7 +1610,7 @@
           <p:cNvPr id="4" name="Content Placeholder 3">
             <a:extLst>
               <a:ext uri="{FF2B5EF4-FFF2-40B4-BE49-F238E27FC236}">
-                <a16:creationId xmlns:a16="http://schemas.microsoft.com/office/drawing/2014/main" id="{FC65337C-FBAA-469E-A20A-8CC056693C65}"/>
+                <a16:creationId xmlns:a16="http://schemas.microsoft.com/office/drawing/2014/main" xmlns="" id="{FC65337C-FBAA-469E-A20A-8CC056693C65}"/>
               </a:ext>
             </a:extLst>
           </p:cNvPr>
@@ -1673,7 +1673,7 @@
           <p:cNvPr id="5" name="Text Placeholder 4">
             <a:extLst>
               <a:ext uri="{FF2B5EF4-FFF2-40B4-BE49-F238E27FC236}">
-                <a16:creationId xmlns:a16="http://schemas.microsoft.com/office/drawing/2014/main" id="{9E30DFE3-C39B-43E0-860F-F5097EBD1BE7}"/>
+                <a16:creationId xmlns:a16="http://schemas.microsoft.com/office/drawing/2014/main" xmlns="" id="{9E30DFE3-C39B-43E0-860F-F5097EBD1BE7}"/>
               </a:ext>
             </a:extLst>
           </p:cNvPr>
@@ -1744,7 +1744,7 @@
           <p:cNvPr id="6" name="Content Placeholder 5">
             <a:extLst>
               <a:ext uri="{FF2B5EF4-FFF2-40B4-BE49-F238E27FC236}">
-                <a16:creationId xmlns:a16="http://schemas.microsoft.com/office/drawing/2014/main" id="{CA7BAAAB-5139-4A1F-A074-3A4662DC88E4}"/>
+                <a16:creationId xmlns:a16="http://schemas.microsoft.com/office/drawing/2014/main" xmlns="" id="{CA7BAAAB-5139-4A1F-A074-3A4662DC88E4}"/>
               </a:ext>
             </a:extLst>
           </p:cNvPr>
@@ -1807,7 +1807,7 @@
           <p:cNvPr id="7" name="Date Placeholder 6">
             <a:extLst>
               <a:ext uri="{FF2B5EF4-FFF2-40B4-BE49-F238E27FC236}">
-                <a16:creationId xmlns:a16="http://schemas.microsoft.com/office/drawing/2014/main" id="{01DCBEEE-48CE-41D3-BECD-4892E480181B}"/>
+                <a16:creationId xmlns:a16="http://schemas.microsoft.com/office/drawing/2014/main" xmlns="" id="{01DCBEEE-48CE-41D3-BECD-4892E480181B}"/>
               </a:ext>
             </a:extLst>
           </p:cNvPr>
@@ -1836,7 +1836,7 @@
           <p:cNvPr id="8" name="Footer Placeholder 7">
             <a:extLst>
               <a:ext uri="{FF2B5EF4-FFF2-40B4-BE49-F238E27FC236}">
-                <a16:creationId xmlns:a16="http://schemas.microsoft.com/office/drawing/2014/main" id="{9FF03130-B860-4D44-81FB-5842A2575015}"/>
+                <a16:creationId xmlns:a16="http://schemas.microsoft.com/office/drawing/2014/main" xmlns="" id="{9FF03130-B860-4D44-81FB-5842A2575015}"/>
               </a:ext>
             </a:extLst>
           </p:cNvPr>
@@ -1861,7 +1861,7 @@
           <p:cNvPr id="9" name="Slide Number Placeholder 8">
             <a:extLst>
               <a:ext uri="{FF2B5EF4-FFF2-40B4-BE49-F238E27FC236}">
-                <a16:creationId xmlns:a16="http://schemas.microsoft.com/office/drawing/2014/main" id="{E8D11452-DAAC-4324-8A54-FC128EAA004C}"/>
+                <a16:creationId xmlns:a16="http://schemas.microsoft.com/office/drawing/2014/main" xmlns="" id="{E8D11452-DAAC-4324-8A54-FC128EAA004C}"/>
               </a:ext>
             </a:extLst>
           </p:cNvPr>
@@ -1920,7 +1920,7 @@
           <p:cNvPr id="2" name="Title 1">
             <a:extLst>
               <a:ext uri="{FF2B5EF4-FFF2-40B4-BE49-F238E27FC236}">
-                <a16:creationId xmlns:a16="http://schemas.microsoft.com/office/drawing/2014/main" id="{9DA844CD-8692-41EF-B33C-83A598D2E7D9}"/>
+                <a16:creationId xmlns:a16="http://schemas.microsoft.com/office/drawing/2014/main" xmlns="" id="{9DA844CD-8692-41EF-B33C-83A598D2E7D9}"/>
               </a:ext>
             </a:extLst>
           </p:cNvPr>
@@ -1949,7 +1949,7 @@
           <p:cNvPr id="3" name="Date Placeholder 2">
             <a:extLst>
               <a:ext uri="{FF2B5EF4-FFF2-40B4-BE49-F238E27FC236}">
-                <a16:creationId xmlns:a16="http://schemas.microsoft.com/office/drawing/2014/main" id="{4C66EE65-F7E5-43DF-B256-72BFC143E047}"/>
+                <a16:creationId xmlns:a16="http://schemas.microsoft.com/office/drawing/2014/main" xmlns="" id="{4C66EE65-F7E5-43DF-B256-72BFC143E047}"/>
               </a:ext>
             </a:extLst>
           </p:cNvPr>
@@ -1978,7 +1978,7 @@
           <p:cNvPr id="4" name="Footer Placeholder 3">
             <a:extLst>
               <a:ext uri="{FF2B5EF4-FFF2-40B4-BE49-F238E27FC236}">
-                <a16:creationId xmlns:a16="http://schemas.microsoft.com/office/drawing/2014/main" id="{7045BC85-1066-4B9E-BBA5-26BE7C4291FD}"/>
+                <a16:creationId xmlns:a16="http://schemas.microsoft.com/office/drawing/2014/main" xmlns="" id="{7045BC85-1066-4B9E-BBA5-26BE7C4291FD}"/>
               </a:ext>
             </a:extLst>
           </p:cNvPr>
@@ -2003,7 +2003,7 @@
           <p:cNvPr id="5" name="Slide Number Placeholder 4">
             <a:extLst>
               <a:ext uri="{FF2B5EF4-FFF2-40B4-BE49-F238E27FC236}">
-                <a16:creationId xmlns:a16="http://schemas.microsoft.com/office/drawing/2014/main" id="{B1E2F4F8-E330-403E-820F-BB3B32097039}"/>
+                <a16:creationId xmlns:a16="http://schemas.microsoft.com/office/drawing/2014/main" xmlns="" id="{B1E2F4F8-E330-403E-820F-BB3B32097039}"/>
               </a:ext>
             </a:extLst>
           </p:cNvPr>
@@ -2062,7 +2062,7 @@
           <p:cNvPr id="2" name="Date Placeholder 1">
             <a:extLst>
               <a:ext uri="{FF2B5EF4-FFF2-40B4-BE49-F238E27FC236}">
-                <a16:creationId xmlns:a16="http://schemas.microsoft.com/office/drawing/2014/main" id="{91568C99-F403-4CF8-9F32-1FB9B81679FC}"/>
+                <a16:creationId xmlns:a16="http://schemas.microsoft.com/office/drawing/2014/main" xmlns="" id="{91568C99-F403-4CF8-9F32-1FB9B81679FC}"/>
               </a:ext>
             </a:extLst>
           </p:cNvPr>
@@ -2091,7 +2091,7 @@
           <p:cNvPr id="3" name="Footer Placeholder 2">
             <a:extLst>
               <a:ext uri="{FF2B5EF4-FFF2-40B4-BE49-F238E27FC236}">
-                <a16:creationId xmlns:a16="http://schemas.microsoft.com/office/drawing/2014/main" id="{058A62A0-41D6-4757-A930-B977E7652839}"/>
+                <a16:creationId xmlns:a16="http://schemas.microsoft.com/office/drawing/2014/main" xmlns="" id="{058A62A0-41D6-4757-A930-B977E7652839}"/>
               </a:ext>
             </a:extLst>
           </p:cNvPr>
@@ -2116,7 +2116,7 @@
           <p:cNvPr id="4" name="Slide Number Placeholder 3">
             <a:extLst>
               <a:ext uri="{FF2B5EF4-FFF2-40B4-BE49-F238E27FC236}">
-                <a16:creationId xmlns:a16="http://schemas.microsoft.com/office/drawing/2014/main" id="{5A0F93F6-9063-4D62-8E98-598F34FD62F2}"/>
+                <a16:creationId xmlns:a16="http://schemas.microsoft.com/office/drawing/2014/main" xmlns="" id="{5A0F93F6-9063-4D62-8E98-598F34FD62F2}"/>
               </a:ext>
             </a:extLst>
           </p:cNvPr>
@@ -2175,7 +2175,7 @@
           <p:cNvPr id="2" name="Title 1">
             <a:extLst>
               <a:ext uri="{FF2B5EF4-FFF2-40B4-BE49-F238E27FC236}">
-                <a16:creationId xmlns:a16="http://schemas.microsoft.com/office/drawing/2014/main" id="{A696A938-AA60-49C9-9912-D80805D10FFE}"/>
+                <a16:creationId xmlns:a16="http://schemas.microsoft.com/office/drawing/2014/main" xmlns="" id="{A696A938-AA60-49C9-9912-D80805D10FFE}"/>
               </a:ext>
             </a:extLst>
           </p:cNvPr>
@@ -2213,7 +2213,7 @@
           <p:cNvPr id="3" name="Content Placeholder 2">
             <a:extLst>
               <a:ext uri="{FF2B5EF4-FFF2-40B4-BE49-F238E27FC236}">
-                <a16:creationId xmlns:a16="http://schemas.microsoft.com/office/drawing/2014/main" id="{D1B23CB8-B312-4949-9410-FF121C7A7E73}"/>
+                <a16:creationId xmlns:a16="http://schemas.microsoft.com/office/drawing/2014/main" xmlns="" id="{D1B23CB8-B312-4949-9410-FF121C7A7E73}"/>
               </a:ext>
             </a:extLst>
           </p:cNvPr>
@@ -2304,7 +2304,7 @@
           <p:cNvPr id="4" name="Text Placeholder 3">
             <a:extLst>
               <a:ext uri="{FF2B5EF4-FFF2-40B4-BE49-F238E27FC236}">
-                <a16:creationId xmlns:a16="http://schemas.microsoft.com/office/drawing/2014/main" id="{54198BD9-6ED5-467E-93B5-7FFEF625AD93}"/>
+                <a16:creationId xmlns:a16="http://schemas.microsoft.com/office/drawing/2014/main" xmlns="" id="{54198BD9-6ED5-467E-93B5-7FFEF625AD93}"/>
               </a:ext>
             </a:extLst>
           </p:cNvPr>
@@ -2375,7 +2375,7 @@
           <p:cNvPr id="5" name="Date Placeholder 4">
             <a:extLst>
               <a:ext uri="{FF2B5EF4-FFF2-40B4-BE49-F238E27FC236}">
-                <a16:creationId xmlns:a16="http://schemas.microsoft.com/office/drawing/2014/main" id="{14B5504D-81AC-48C8-838C-44A6DDBAE8EB}"/>
+                <a16:creationId xmlns:a16="http://schemas.microsoft.com/office/drawing/2014/main" xmlns="" id="{14B5504D-81AC-48C8-838C-44A6DDBAE8EB}"/>
               </a:ext>
             </a:extLst>
           </p:cNvPr>
@@ -2404,7 +2404,7 @@
           <p:cNvPr id="6" name="Footer Placeholder 5">
             <a:extLst>
               <a:ext uri="{FF2B5EF4-FFF2-40B4-BE49-F238E27FC236}">
-                <a16:creationId xmlns:a16="http://schemas.microsoft.com/office/drawing/2014/main" id="{BB82F0EC-D5BC-4685-9E46-6F702D55EF93}"/>
+                <a16:creationId xmlns:a16="http://schemas.microsoft.com/office/drawing/2014/main" xmlns="" id="{BB82F0EC-D5BC-4685-9E46-6F702D55EF93}"/>
               </a:ext>
             </a:extLst>
           </p:cNvPr>
@@ -2429,7 +2429,7 @@
           <p:cNvPr id="7" name="Slide Number Placeholder 6">
             <a:extLst>
               <a:ext uri="{FF2B5EF4-FFF2-40B4-BE49-F238E27FC236}">
-                <a16:creationId xmlns:a16="http://schemas.microsoft.com/office/drawing/2014/main" id="{93CF6B1F-F490-4962-A12C-C25AE998B9CE}"/>
+                <a16:creationId xmlns:a16="http://schemas.microsoft.com/office/drawing/2014/main" xmlns="" id="{93CF6B1F-F490-4962-A12C-C25AE998B9CE}"/>
               </a:ext>
             </a:extLst>
           </p:cNvPr>
@@ -2488,7 +2488,7 @@
           <p:cNvPr id="2" name="Title 1">
             <a:extLst>
               <a:ext uri="{FF2B5EF4-FFF2-40B4-BE49-F238E27FC236}">
-                <a16:creationId xmlns:a16="http://schemas.microsoft.com/office/drawing/2014/main" id="{D7EBF388-4BBC-4327-8B78-925CA0F72B89}"/>
+                <a16:creationId xmlns:a16="http://schemas.microsoft.com/office/drawing/2014/main" xmlns="" id="{D7EBF388-4BBC-4327-8B78-925CA0F72B89}"/>
               </a:ext>
             </a:extLst>
           </p:cNvPr>
@@ -2526,7 +2526,7 @@
           <p:cNvPr id="3" name="Picture Placeholder 2">
             <a:extLst>
               <a:ext uri="{FF2B5EF4-FFF2-40B4-BE49-F238E27FC236}">
-                <a16:creationId xmlns:a16="http://schemas.microsoft.com/office/drawing/2014/main" id="{3EF38832-32F1-46DC-8D0D-E28E26C280EA}"/>
+                <a16:creationId xmlns:a16="http://schemas.microsoft.com/office/drawing/2014/main" xmlns="" id="{3EF38832-32F1-46DC-8D0D-E28E26C280EA}"/>
               </a:ext>
             </a:extLst>
           </p:cNvPr>
@@ -2593,7 +2593,7 @@
           <p:cNvPr id="4" name="Text Placeholder 3">
             <a:extLst>
               <a:ext uri="{FF2B5EF4-FFF2-40B4-BE49-F238E27FC236}">
-                <a16:creationId xmlns:a16="http://schemas.microsoft.com/office/drawing/2014/main" id="{7E446FAE-B132-45CA-9ABB-9D3012E7CBD3}"/>
+                <a16:creationId xmlns:a16="http://schemas.microsoft.com/office/drawing/2014/main" xmlns="" id="{7E446FAE-B132-45CA-9ABB-9D3012E7CBD3}"/>
               </a:ext>
             </a:extLst>
           </p:cNvPr>
@@ -2664,7 +2664,7 @@
           <p:cNvPr id="5" name="Date Placeholder 4">
             <a:extLst>
               <a:ext uri="{FF2B5EF4-FFF2-40B4-BE49-F238E27FC236}">
-                <a16:creationId xmlns:a16="http://schemas.microsoft.com/office/drawing/2014/main" id="{67FD7515-097B-46F8-97CD-DE92A137B1E8}"/>
+                <a16:creationId xmlns:a16="http://schemas.microsoft.com/office/drawing/2014/main" xmlns="" id="{67FD7515-097B-46F8-97CD-DE92A137B1E8}"/>
               </a:ext>
             </a:extLst>
           </p:cNvPr>
@@ -2693,7 +2693,7 @@
           <p:cNvPr id="6" name="Footer Placeholder 5">
             <a:extLst>
               <a:ext uri="{FF2B5EF4-FFF2-40B4-BE49-F238E27FC236}">
-                <a16:creationId xmlns:a16="http://schemas.microsoft.com/office/drawing/2014/main" id="{2D8476D7-DA18-47A7-B40B-E673028D7736}"/>
+                <a16:creationId xmlns:a16="http://schemas.microsoft.com/office/drawing/2014/main" xmlns="" id="{2D8476D7-DA18-47A7-B40B-E673028D7736}"/>
               </a:ext>
             </a:extLst>
           </p:cNvPr>
@@ -2718,7 +2718,7 @@
           <p:cNvPr id="7" name="Slide Number Placeholder 6">
             <a:extLst>
               <a:ext uri="{FF2B5EF4-FFF2-40B4-BE49-F238E27FC236}">
-                <a16:creationId xmlns:a16="http://schemas.microsoft.com/office/drawing/2014/main" id="{A0BFA4ED-8CEA-461D-940A-946A8F868E2D}"/>
+                <a16:creationId xmlns:a16="http://schemas.microsoft.com/office/drawing/2014/main" xmlns="" id="{A0BFA4ED-8CEA-461D-940A-946A8F868E2D}"/>
               </a:ext>
             </a:extLst>
           </p:cNvPr>
@@ -2782,7 +2782,7 @@
           <p:cNvPr id="2" name="Title Placeholder 1">
             <a:extLst>
               <a:ext uri="{FF2B5EF4-FFF2-40B4-BE49-F238E27FC236}">
-                <a16:creationId xmlns:a16="http://schemas.microsoft.com/office/drawing/2014/main" id="{AF5FDA6F-37D7-4AFF-9DAD-EDEECA5C0CEC}"/>
+                <a16:creationId xmlns:a16="http://schemas.microsoft.com/office/drawing/2014/main" xmlns="" id="{AF5FDA6F-37D7-4AFF-9DAD-EDEECA5C0CEC}"/>
               </a:ext>
             </a:extLst>
           </p:cNvPr>
@@ -2821,7 +2821,7 @@
           <p:cNvPr id="3" name="Text Placeholder 2">
             <a:extLst>
               <a:ext uri="{FF2B5EF4-FFF2-40B4-BE49-F238E27FC236}">
-                <a16:creationId xmlns:a16="http://schemas.microsoft.com/office/drawing/2014/main" id="{7F8A5C2A-91FE-45ED-8ADC-6CE54DC18CA6}"/>
+                <a16:creationId xmlns:a16="http://schemas.microsoft.com/office/drawing/2014/main" xmlns="" id="{7F8A5C2A-91FE-45ED-8ADC-6CE54DC18CA6}"/>
               </a:ext>
             </a:extLst>
           </p:cNvPr>
@@ -2889,7 +2889,7 @@
           <p:cNvPr id="4" name="Date Placeholder 3">
             <a:extLst>
               <a:ext uri="{FF2B5EF4-FFF2-40B4-BE49-F238E27FC236}">
-                <a16:creationId xmlns:a16="http://schemas.microsoft.com/office/drawing/2014/main" id="{88EE8785-9EC3-4F50-B024-1BC664C0D768}"/>
+                <a16:creationId xmlns:a16="http://schemas.microsoft.com/office/drawing/2014/main" xmlns="" id="{88EE8785-9EC3-4F50-B024-1BC664C0D768}"/>
               </a:ext>
             </a:extLst>
           </p:cNvPr>
@@ -2936,7 +2936,7 @@
           <p:cNvPr id="5" name="Footer Placeholder 4">
             <a:extLst>
               <a:ext uri="{FF2B5EF4-FFF2-40B4-BE49-F238E27FC236}">
-                <a16:creationId xmlns:a16="http://schemas.microsoft.com/office/drawing/2014/main" id="{D373EDC1-9C9B-4416-84A5-F276ECCEDA28}"/>
+                <a16:creationId xmlns:a16="http://schemas.microsoft.com/office/drawing/2014/main" xmlns="" id="{D373EDC1-9C9B-4416-84A5-F276ECCEDA28}"/>
               </a:ext>
             </a:extLst>
           </p:cNvPr>
@@ -2979,7 +2979,7 @@
           <p:cNvPr id="6" name="Slide Number Placeholder 5">
             <a:extLst>
               <a:ext uri="{FF2B5EF4-FFF2-40B4-BE49-F238E27FC236}">
-                <a16:creationId xmlns:a16="http://schemas.microsoft.com/office/drawing/2014/main" id="{8F4E1A8D-3D0F-4B57-92CA-0FF490CEE4BE}"/>
+                <a16:creationId xmlns:a16="http://schemas.microsoft.com/office/drawing/2014/main" xmlns="" id="{8F4E1A8D-3D0F-4B57-92CA-0FF490CEE4BE}"/>
               </a:ext>
             </a:extLst>
           </p:cNvPr>
@@ -3347,7 +3347,7 @@
           <p:cNvPr id="4" name="Rectangle 62">
             <a:extLst>
               <a:ext uri="{FF2B5EF4-FFF2-40B4-BE49-F238E27FC236}">
-                <a16:creationId xmlns:a16="http://schemas.microsoft.com/office/drawing/2014/main" id="{C89D399F-5703-40BC-B413-5DBB6349D2CA}"/>
+                <a16:creationId xmlns:a16="http://schemas.microsoft.com/office/drawing/2014/main" xmlns="" id="{C89D399F-5703-40BC-B413-5DBB6349D2CA}"/>
               </a:ext>
             </a:extLst>
           </p:cNvPr>
@@ -3412,7 +3412,7 @@
           <p:cNvPr id="5" name="Straight Connector 4">
             <a:extLst>
               <a:ext uri="{FF2B5EF4-FFF2-40B4-BE49-F238E27FC236}">
-                <a16:creationId xmlns:a16="http://schemas.microsoft.com/office/drawing/2014/main" id="{437CE675-455E-452B-AB00-393AB490FFCB}"/>
+                <a16:creationId xmlns:a16="http://schemas.microsoft.com/office/drawing/2014/main" xmlns="" id="{437CE675-455E-452B-AB00-393AB490FFCB}"/>
               </a:ext>
             </a:extLst>
           </p:cNvPr>
@@ -3455,7 +3455,7 @@
           <p:cNvPr id="6" name="Rectangle 5">
             <a:extLst>
               <a:ext uri="{FF2B5EF4-FFF2-40B4-BE49-F238E27FC236}">
-                <a16:creationId xmlns:a16="http://schemas.microsoft.com/office/drawing/2014/main" id="{4E73309D-58CC-431E-81F9-B1E6F9936217}"/>
+                <a16:creationId xmlns:a16="http://schemas.microsoft.com/office/drawing/2014/main" xmlns="" id="{4E73309D-58CC-431E-81F9-B1E6F9936217}"/>
               </a:ext>
             </a:extLst>
           </p:cNvPr>
@@ -3512,7 +3512,7 @@
           <p:cNvPr id="7" name="Actor">
             <a:extLst>
               <a:ext uri="{FF2B5EF4-FFF2-40B4-BE49-F238E27FC236}">
-                <a16:creationId xmlns:a16="http://schemas.microsoft.com/office/drawing/2014/main" id="{35F7EB29-A64B-42EC-89FF-C61698A5DA5D}"/>
+                <a16:creationId xmlns:a16="http://schemas.microsoft.com/office/drawing/2014/main" xmlns="" id="{35F7EB29-A64B-42EC-89FF-C61698A5DA5D}"/>
               </a:ext>
             </a:extLst>
           </p:cNvPr>
@@ -3532,7 +3532,7 @@
             <p:cNvPr id="8" name="Flowchart: Connector 7">
               <a:extLst>
                 <a:ext uri="{FF2B5EF4-FFF2-40B4-BE49-F238E27FC236}">
-                  <a16:creationId xmlns:a16="http://schemas.microsoft.com/office/drawing/2014/main" id="{CDE33B23-B58F-4A25-9268-5FA2108BED76}"/>
+                  <a16:creationId xmlns:a16="http://schemas.microsoft.com/office/drawing/2014/main" xmlns="" id="{CDE33B23-B58F-4A25-9268-5FA2108BED76}"/>
                 </a:ext>
               </a:extLst>
             </p:cNvPr>
@@ -3587,7 +3587,7 @@
             <p:cNvPr id="9" name="Straight Connector 8">
               <a:extLst>
                 <a:ext uri="{FF2B5EF4-FFF2-40B4-BE49-F238E27FC236}">
-                  <a16:creationId xmlns:a16="http://schemas.microsoft.com/office/drawing/2014/main" id="{09950D88-CE7B-48E2-BDE4-E5EBBEB6B9EC}"/>
+                  <a16:creationId xmlns:a16="http://schemas.microsoft.com/office/drawing/2014/main" xmlns="" id="{09950D88-CE7B-48E2-BDE4-E5EBBEB6B9EC}"/>
                 </a:ext>
               </a:extLst>
             </p:cNvPr>
@@ -3631,7 +3631,7 @@
             <p:cNvPr id="10" name="Freeform 9">
               <a:extLst>
                 <a:ext uri="{FF2B5EF4-FFF2-40B4-BE49-F238E27FC236}">
-                  <a16:creationId xmlns:a16="http://schemas.microsoft.com/office/drawing/2014/main" id="{89F2468F-50F7-4C20-BD39-DC2374F6FEA3}"/>
+                  <a16:creationId xmlns:a16="http://schemas.microsoft.com/office/drawing/2014/main" xmlns="" id="{89F2468F-50F7-4C20-BD39-DC2374F6FEA3}"/>
                 </a:ext>
               </a:extLst>
             </p:cNvPr>
@@ -3716,7 +3716,7 @@
             <p:cNvPr id="11" name="Straight Connector 10">
               <a:extLst>
                 <a:ext uri="{FF2B5EF4-FFF2-40B4-BE49-F238E27FC236}">
-                  <a16:creationId xmlns:a16="http://schemas.microsoft.com/office/drawing/2014/main" id="{E13874AF-6505-4FBF-AA77-C95B242CD1C3}"/>
+                  <a16:creationId xmlns:a16="http://schemas.microsoft.com/office/drawing/2014/main" xmlns="" id="{E13874AF-6505-4FBF-AA77-C95B242CD1C3}"/>
                 </a:ext>
               </a:extLst>
             </p:cNvPr>
@@ -3759,7 +3759,7 @@
           <p:cNvPr id="12" name="Rectangle 62">
             <a:extLst>
               <a:ext uri="{FF2B5EF4-FFF2-40B4-BE49-F238E27FC236}">
-                <a16:creationId xmlns:a16="http://schemas.microsoft.com/office/drawing/2014/main" id="{773326AB-C158-4834-A7E8-BB177900047C}"/>
+                <a16:creationId xmlns:a16="http://schemas.microsoft.com/office/drawing/2014/main" xmlns="" id="{773326AB-C158-4834-A7E8-BB177900047C}"/>
               </a:ext>
             </a:extLst>
           </p:cNvPr>
@@ -3824,7 +3824,7 @@
           <p:cNvPr id="13" name="Straight Connector 12">
             <a:extLst>
               <a:ext uri="{FF2B5EF4-FFF2-40B4-BE49-F238E27FC236}">
-                <a16:creationId xmlns:a16="http://schemas.microsoft.com/office/drawing/2014/main" id="{F1F0FB79-6539-4B98-B163-DC3F3E3197FC}"/>
+                <a16:creationId xmlns:a16="http://schemas.microsoft.com/office/drawing/2014/main" xmlns="" id="{F1F0FB79-6539-4B98-B163-DC3F3E3197FC}"/>
               </a:ext>
             </a:extLst>
           </p:cNvPr>
@@ -3867,7 +3867,7 @@
           <p:cNvPr id="14" name="Rectangle 13">
             <a:extLst>
               <a:ext uri="{FF2B5EF4-FFF2-40B4-BE49-F238E27FC236}">
-                <a16:creationId xmlns:a16="http://schemas.microsoft.com/office/drawing/2014/main" id="{C6F469BC-2BB7-4D2E-8E74-1C2636E36B94}"/>
+                <a16:creationId xmlns:a16="http://schemas.microsoft.com/office/drawing/2014/main" xmlns="" id="{C6F469BC-2BB7-4D2E-8E74-1C2636E36B94}"/>
               </a:ext>
             </a:extLst>
           </p:cNvPr>
@@ -3924,7 +3924,7 @@
           <p:cNvPr id="15" name="Rectangle 62">
             <a:extLst>
               <a:ext uri="{FF2B5EF4-FFF2-40B4-BE49-F238E27FC236}">
-                <a16:creationId xmlns:a16="http://schemas.microsoft.com/office/drawing/2014/main" id="{AC75E361-E731-4803-B501-31BAEA2EDD88}"/>
+                <a16:creationId xmlns:a16="http://schemas.microsoft.com/office/drawing/2014/main" xmlns="" id="{AC75E361-E731-4803-B501-31BAEA2EDD88}"/>
               </a:ext>
             </a:extLst>
           </p:cNvPr>
@@ -3989,7 +3989,7 @@
           <p:cNvPr id="16" name="Straight Connector 15">
             <a:extLst>
               <a:ext uri="{FF2B5EF4-FFF2-40B4-BE49-F238E27FC236}">
-                <a16:creationId xmlns:a16="http://schemas.microsoft.com/office/drawing/2014/main" id="{6E5E3425-8530-4D9C-BD0F-B9744A70DCD7}"/>
+                <a16:creationId xmlns:a16="http://schemas.microsoft.com/office/drawing/2014/main" xmlns="" id="{6E5E3425-8530-4D9C-BD0F-B9744A70DCD7}"/>
               </a:ext>
             </a:extLst>
           </p:cNvPr>
@@ -4032,7 +4032,7 @@
           <p:cNvPr id="17" name="Rectangle 16">
             <a:extLst>
               <a:ext uri="{FF2B5EF4-FFF2-40B4-BE49-F238E27FC236}">
-                <a16:creationId xmlns:a16="http://schemas.microsoft.com/office/drawing/2014/main" id="{1A69F840-889C-4AD9-B36F-9F7F0E349F16}"/>
+                <a16:creationId xmlns:a16="http://schemas.microsoft.com/office/drawing/2014/main" xmlns="" id="{1A69F840-889C-4AD9-B36F-9F7F0E349F16}"/>
               </a:ext>
             </a:extLst>
           </p:cNvPr>
@@ -4089,7 +4089,7 @@
           <p:cNvPr id="18" name="Straight Arrow Connector 17">
             <a:extLst>
               <a:ext uri="{FF2B5EF4-FFF2-40B4-BE49-F238E27FC236}">
-                <a16:creationId xmlns:a16="http://schemas.microsoft.com/office/drawing/2014/main" id="{9A14F506-CD2A-44D6-A868-59691844AA68}"/>
+                <a16:creationId xmlns:a16="http://schemas.microsoft.com/office/drawing/2014/main" xmlns="" id="{9A14F506-CD2A-44D6-A868-59691844AA68}"/>
               </a:ext>
             </a:extLst>
           </p:cNvPr>
@@ -4131,7 +4131,7 @@
           <p:cNvPr id="19" name="TextBox 18">
             <a:extLst>
               <a:ext uri="{FF2B5EF4-FFF2-40B4-BE49-F238E27FC236}">
-                <a16:creationId xmlns:a16="http://schemas.microsoft.com/office/drawing/2014/main" id="{79DD46E7-A100-4727-875A-375120E09855}"/>
+                <a16:creationId xmlns:a16="http://schemas.microsoft.com/office/drawing/2014/main" xmlns="" id="{79DD46E7-A100-4727-875A-375120E09855}"/>
               </a:ext>
             </a:extLst>
           </p:cNvPr>
@@ -4171,7 +4171,7 @@
           <p:cNvPr id="20" name="Straight Arrow Connector 19">
             <a:extLst>
               <a:ext uri="{FF2B5EF4-FFF2-40B4-BE49-F238E27FC236}">
-                <a16:creationId xmlns:a16="http://schemas.microsoft.com/office/drawing/2014/main" id="{63B2FAED-D67F-4042-B5E8-21AF18A9164E}"/>
+                <a16:creationId xmlns:a16="http://schemas.microsoft.com/office/drawing/2014/main" xmlns="" id="{63B2FAED-D67F-4042-B5E8-21AF18A9164E}"/>
               </a:ext>
             </a:extLst>
           </p:cNvPr>
@@ -4213,7 +4213,7 @@
           <p:cNvPr id="21" name="TextBox 20">
             <a:extLst>
               <a:ext uri="{FF2B5EF4-FFF2-40B4-BE49-F238E27FC236}">
-                <a16:creationId xmlns:a16="http://schemas.microsoft.com/office/drawing/2014/main" id="{87D84A9A-21CD-45D2-86F0-FF666534BE6B}"/>
+                <a16:creationId xmlns:a16="http://schemas.microsoft.com/office/drawing/2014/main" xmlns="" id="{87D84A9A-21CD-45D2-86F0-FF666534BE6B}"/>
               </a:ext>
             </a:extLst>
           </p:cNvPr>
@@ -4252,7 +4252,7 @@
           <p:cNvPr id="22" name="Straight Arrow Connector 21">
             <a:extLst>
               <a:ext uri="{FF2B5EF4-FFF2-40B4-BE49-F238E27FC236}">
-                <a16:creationId xmlns:a16="http://schemas.microsoft.com/office/drawing/2014/main" id="{A2119603-2D98-4E99-A83E-9870CDB65F00}"/>
+                <a16:creationId xmlns:a16="http://schemas.microsoft.com/office/drawing/2014/main" xmlns="" id="{A2119603-2D98-4E99-A83E-9870CDB65F00}"/>
               </a:ext>
             </a:extLst>
           </p:cNvPr>
@@ -4294,7 +4294,7 @@
           <p:cNvPr id="23" name="TextBox 22">
             <a:extLst>
               <a:ext uri="{FF2B5EF4-FFF2-40B4-BE49-F238E27FC236}">
-                <a16:creationId xmlns:a16="http://schemas.microsoft.com/office/drawing/2014/main" id="{61A0CB29-DFD9-4389-BDFE-17B98E015BB3}"/>
+                <a16:creationId xmlns:a16="http://schemas.microsoft.com/office/drawing/2014/main" xmlns="" id="{61A0CB29-DFD9-4389-BDFE-17B98E015BB3}"/>
               </a:ext>
             </a:extLst>
           </p:cNvPr>
@@ -4342,7 +4342,7 @@
           <p:cNvPr id="24" name="TextBox 23">
             <a:extLst>
               <a:ext uri="{FF2B5EF4-FFF2-40B4-BE49-F238E27FC236}">
-                <a16:creationId xmlns:a16="http://schemas.microsoft.com/office/drawing/2014/main" id="{9120F23F-E06F-4184-92E7-D97817860C14}"/>
+                <a16:creationId xmlns:a16="http://schemas.microsoft.com/office/drawing/2014/main" xmlns="" id="{9120F23F-E06F-4184-92E7-D97817860C14}"/>
               </a:ext>
             </a:extLst>
           </p:cNvPr>
@@ -4366,17 +4366,17 @@
           <a:lstStyle/>
           <a:p>
             <a:r>
-              <a:rPr lang="en-US" sz="1400" dirty="0">
+              <a:rPr lang="en-US" sz="1400" dirty="0" smtClean="0">
                 <a:solidFill>
                   <a:schemeClr val="accent5">
                     <a:lumMod val="75000"/>
                   </a:schemeClr>
                 </a:solidFill>
               </a:rPr>
-              <a:t>post(</a:t>
-            </a:r>
-            <a:r>
-              <a:rPr lang="en-US" sz="1400" dirty="0" err="1">
+              <a:t>raise(</a:t>
+            </a:r>
+            <a:r>
+              <a:rPr lang="en-US" sz="1400" dirty="0" err="1" smtClean="0">
                 <a:solidFill>
                   <a:schemeClr val="accent5">
                     <a:lumMod val="75000"/>
@@ -4403,7 +4403,7 @@
           <p:cNvPr id="25" name="Straight Arrow Connector 24">
             <a:extLst>
               <a:ext uri="{FF2B5EF4-FFF2-40B4-BE49-F238E27FC236}">
-                <a16:creationId xmlns:a16="http://schemas.microsoft.com/office/drawing/2014/main" id="{0617E102-2B60-4A5C-A14C-9F4F93F6F112}"/>
+                <a16:creationId xmlns:a16="http://schemas.microsoft.com/office/drawing/2014/main" xmlns="" id="{0617E102-2B60-4A5C-A14C-9F4F93F6F112}"/>
               </a:ext>
             </a:extLst>
           </p:cNvPr>
@@ -4447,7 +4447,7 @@
           <p:cNvPr id="26" name="Straight Arrow Connector 25">
             <a:extLst>
               <a:ext uri="{FF2B5EF4-FFF2-40B4-BE49-F238E27FC236}">
-                <a16:creationId xmlns:a16="http://schemas.microsoft.com/office/drawing/2014/main" id="{9A140690-C4E2-4828-8128-D5F486DCB968}"/>
+                <a16:creationId xmlns:a16="http://schemas.microsoft.com/office/drawing/2014/main" xmlns="" id="{9A140690-C4E2-4828-8128-D5F486DCB968}"/>
               </a:ext>
             </a:extLst>
           </p:cNvPr>
@@ -4491,7 +4491,7 @@
           <p:cNvPr id="27" name="Straight Arrow Connector 26">
             <a:extLst>
               <a:ext uri="{FF2B5EF4-FFF2-40B4-BE49-F238E27FC236}">
-                <a16:creationId xmlns:a16="http://schemas.microsoft.com/office/drawing/2014/main" id="{9EEBD8A4-B1CD-43E9-BE63-07232E513FD3}"/>
+                <a16:creationId xmlns:a16="http://schemas.microsoft.com/office/drawing/2014/main" xmlns="" id="{9EEBD8A4-B1CD-43E9-BE63-07232E513FD3}"/>
               </a:ext>
             </a:extLst>
           </p:cNvPr>
@@ -4535,7 +4535,7 @@
           <p:cNvPr id="28" name="Rectangle 62">
             <a:extLst>
               <a:ext uri="{FF2B5EF4-FFF2-40B4-BE49-F238E27FC236}">
-                <a16:creationId xmlns:a16="http://schemas.microsoft.com/office/drawing/2014/main" id="{CEDAD3B9-BA30-4CFF-A495-1EB3E8BA5447}"/>
+                <a16:creationId xmlns:a16="http://schemas.microsoft.com/office/drawing/2014/main" xmlns="" id="{CEDAD3B9-BA30-4CFF-A495-1EB3E8BA5447}"/>
               </a:ext>
             </a:extLst>
           </p:cNvPr>
@@ -4612,7 +4612,7 @@
           <p:cNvPr id="29" name="Straight Connector 28">
             <a:extLst>
               <a:ext uri="{FF2B5EF4-FFF2-40B4-BE49-F238E27FC236}">
-                <a16:creationId xmlns:a16="http://schemas.microsoft.com/office/drawing/2014/main" id="{50F062D8-7733-40F0-BD0B-387DDA5BDD6C}"/>
+                <a16:creationId xmlns:a16="http://schemas.microsoft.com/office/drawing/2014/main" xmlns="" id="{50F062D8-7733-40F0-BD0B-387DDA5BDD6C}"/>
               </a:ext>
             </a:extLst>
           </p:cNvPr>
@@ -4657,7 +4657,7 @@
           <p:cNvPr id="30" name="Rectangle 29">
             <a:extLst>
               <a:ext uri="{FF2B5EF4-FFF2-40B4-BE49-F238E27FC236}">
-                <a16:creationId xmlns:a16="http://schemas.microsoft.com/office/drawing/2014/main" id="{E41E7718-5BC0-4B6F-B328-4EAD4701659D}"/>
+                <a16:creationId xmlns:a16="http://schemas.microsoft.com/office/drawing/2014/main" xmlns="" id="{E41E7718-5BC0-4B6F-B328-4EAD4701659D}"/>
               </a:ext>
             </a:extLst>
           </p:cNvPr>
@@ -4718,7 +4718,7 @@
           <p:cNvPr id="31" name="Straight Arrow Connector 30">
             <a:extLst>
               <a:ext uri="{FF2B5EF4-FFF2-40B4-BE49-F238E27FC236}">
-                <a16:creationId xmlns:a16="http://schemas.microsoft.com/office/drawing/2014/main" id="{0973A883-0272-4C4A-B617-169FC4958341}"/>
+                <a16:creationId xmlns:a16="http://schemas.microsoft.com/office/drawing/2014/main" xmlns="" id="{0973A883-0272-4C4A-B617-169FC4958341}"/>
               </a:ext>
             </a:extLst>
           </p:cNvPr>
@@ -4760,7 +4760,7 @@
           <p:cNvPr id="32" name="Straight Arrow Connector 31">
             <a:extLst>
               <a:ext uri="{FF2B5EF4-FFF2-40B4-BE49-F238E27FC236}">
-                <a16:creationId xmlns:a16="http://schemas.microsoft.com/office/drawing/2014/main" id="{27547975-C9C6-49B8-BD4B-6694310F3157}"/>
+                <a16:creationId xmlns:a16="http://schemas.microsoft.com/office/drawing/2014/main" xmlns="" id="{27547975-C9C6-49B8-BD4B-6694310F3157}"/>
               </a:ext>
             </a:extLst>
           </p:cNvPr>
@@ -4806,7 +4806,7 @@
           <p:cNvPr id="33" name="Straight Connector 32">
             <a:extLst>
               <a:ext uri="{FF2B5EF4-FFF2-40B4-BE49-F238E27FC236}">
-                <a16:creationId xmlns:a16="http://schemas.microsoft.com/office/drawing/2014/main" id="{6636EF99-A384-4C96-A4AB-EC4907EC0378}"/>
+                <a16:creationId xmlns:a16="http://schemas.microsoft.com/office/drawing/2014/main" xmlns="" id="{6636EF99-A384-4C96-A4AB-EC4907EC0378}"/>
               </a:ext>
             </a:extLst>
           </p:cNvPr>
@@ -5146,7 +5146,7 @@
   <a:extraClrSchemeLst/>
   <a:extLst>
     <a:ext uri="{05A4C25C-085E-4340-85A3-A5531E510DB2}">
-      <thm15:themeFamily xmlns:thm15="http://schemas.microsoft.com/office/thememl/2012/main" name="Office Theme" id="{62F939B6-93AF-4DB8-9C6B-D6C7DFDC589F}" vid="{4A3C46E8-61CC-4603-A589-7422A47A8E4A}"/>
+      <thm15:themeFamily xmlns:thm15="http://schemas.microsoft.com/office/thememl/2012/main" xmlns="" name="Office Theme" id="{62F939B6-93AF-4DB8-9C6B-D6C7DFDC589F}" vid="{4A3C46E8-61CC-4603-A589-7422A47A8E4A}"/>
     </a:ext>
   </a:extLst>
 </a:theme>

</xml_diff>